<commit_message>
Last-minute modifications to slides
</commit_message>
<xml_diff>
--- a/Slides/00_Introduction.pptx
+++ b/Slides/00_Introduction.pptx
@@ -5,7 +5,7 @@
     <p:sldMasterId id="2147483648" r:id="rId1"/>
   </p:sldMasterIdLst>
   <p:notesMasterIdLst>
-    <p:notesMasterId r:id="rId10"/>
+    <p:notesMasterId r:id="rId12"/>
   </p:notesMasterIdLst>
   <p:sldIdLst>
     <p:sldId id="256" r:id="rId2"/>
@@ -16,6 +16,8 @@
     <p:sldId id="282" r:id="rId7"/>
     <p:sldId id="283" r:id="rId8"/>
     <p:sldId id="278" r:id="rId9"/>
+    <p:sldId id="284" r:id="rId10"/>
+    <p:sldId id="285" r:id="rId11"/>
   </p:sldIdLst>
   <p:sldSz cx="9144000" cy="6858000" type="screen4x3"/>
   <p:notesSz cx="6858000" cy="9144000"/>
@@ -270,7 +272,7 @@
               <a:pPr>
                 <a:defRPr/>
               </a:pPr>
-              <a:t>8/7/2015</a:t>
+              <a:t>8/15/2015</a:t>
             </a:fld>
             <a:endParaRPr lang="en-US"/>
           </a:p>
@@ -4441,13 +4443,6 @@
               </a:rPr>
               <a:t>Taylor R. Stewart, USGS-GLSC, Lake Erie Bio. Station</a:t>
             </a:r>
-            <a:endParaRPr lang="en-US" b="1" dirty="0" smtClean="0">
-              <a:solidFill>
-                <a:schemeClr val="bg2">
-                  <a:lumMod val="25000"/>
-                </a:schemeClr>
-              </a:solidFill>
-            </a:endParaRPr>
           </a:p>
           <a:p>
             <a:pPr algn="l" eaLnBrk="1" fontAlgn="auto" hangingPunct="1">
@@ -4478,6 +4473,144 @@
       </p:par>
     </p:tnLst>
   </p:timing>
+</p:sld>
+</file>
+
+<file path=ppt/slides/slide10.xml><?xml version="1.0" encoding="utf-8"?>
+<p:sld xmlns:a="http://schemas.openxmlformats.org/drawingml/2006/main" xmlns:r="http://schemas.openxmlformats.org/officeDocument/2006/relationships" xmlns:p="http://schemas.openxmlformats.org/presentationml/2006/main">
+  <p:cSld>
+    <p:spTree>
+      <p:nvGrpSpPr>
+        <p:cNvPr id="1" name=""/>
+        <p:cNvGrpSpPr/>
+        <p:nvPr/>
+      </p:nvGrpSpPr>
+      <p:grpSpPr>
+        <a:xfrm>
+          <a:off x="0" y="0"/>
+          <a:ext cx="0" cy="0"/>
+          <a:chOff x="0" y="0"/>
+          <a:chExt cx="0" cy="0"/>
+        </a:xfrm>
+      </p:grpSpPr>
+      <p:sp>
+        <p:nvSpPr>
+          <p:cNvPr id="2" name="Title 1"/>
+          <p:cNvSpPr>
+            <a:spLocks noGrp="1"/>
+          </p:cNvSpPr>
+          <p:nvPr>
+            <p:ph type="title"/>
+          </p:nvPr>
+        </p:nvSpPr>
+        <p:spPr/>
+        <p:txBody>
+          <a:bodyPr/>
+          <a:lstStyle/>
+          <a:p>
+            <a:r>
+              <a:rPr lang="en-US" dirty="0" smtClean="0"/>
+              <a:t>This Better Go Well!!</a:t>
+            </a:r>
+            <a:endParaRPr lang="en-US" dirty="0"/>
+          </a:p>
+        </p:txBody>
+      </p:sp>
+      <p:sp>
+        <p:nvSpPr>
+          <p:cNvPr id="4" name="Footer Placeholder 3"/>
+          <p:cNvSpPr>
+            <a:spLocks noGrp="1"/>
+          </p:cNvSpPr>
+          <p:nvPr>
+            <p:ph type="ftr" sz="quarter" idx="11"/>
+          </p:nvPr>
+        </p:nvSpPr>
+        <p:spPr/>
+        <p:txBody>
+          <a:bodyPr/>
+          <a:lstStyle/>
+          <a:p>
+            <a:pPr>
+              <a:defRPr/>
+            </a:pPr>
+            <a:r>
+              <a:rPr lang="en-US" smtClean="0"/>
+              <a:t>Age &amp; Growth R  ●  Portland, OR ●  16 August 2015</a:t>
+            </a:r>
+            <a:endParaRPr lang="en-US" dirty="0"/>
+          </a:p>
+        </p:txBody>
+      </p:sp>
+      <p:sp>
+        <p:nvSpPr>
+          <p:cNvPr id="5" name="Slide Number Placeholder 4"/>
+          <p:cNvSpPr>
+            <a:spLocks noGrp="1"/>
+          </p:cNvSpPr>
+          <p:nvPr>
+            <p:ph type="sldNum" sz="quarter" idx="12"/>
+          </p:nvPr>
+        </p:nvSpPr>
+        <p:spPr/>
+        <p:txBody>
+          <a:bodyPr/>
+          <a:lstStyle/>
+          <a:p>
+            <a:pPr>
+              <a:defRPr/>
+            </a:pPr>
+            <a:fld id="{BAF8C091-A6FE-48E1-884E-65DA2FC7D7EA}" type="slidenum">
+              <a:rPr lang="en-US" smtClean="0"/>
+              <a:pPr>
+                <a:defRPr/>
+              </a:pPr>
+              <a:t>10</a:t>
+            </a:fld>
+            <a:endParaRPr lang="en-US"/>
+          </a:p>
+        </p:txBody>
+      </p:sp>
+      <p:pic>
+        <p:nvPicPr>
+          <p:cNvPr id="3" name="Picture 2"/>
+          <p:cNvPicPr>
+            <a:picLocks noChangeAspect="1"/>
+          </p:cNvPicPr>
+          <p:nvPr/>
+        </p:nvPicPr>
+        <p:blipFill>
+          <a:blip r:embed="rId2" cstate="print">
+            <a:extLst>
+              <a:ext uri="{28A0092B-C50C-407E-A947-70E740481C1C}">
+                <a14:useLocalDpi xmlns:a14="http://schemas.microsoft.com/office/drawing/2010/main" val="0"/>
+              </a:ext>
+            </a:extLst>
+          </a:blip>
+          <a:stretch>
+            <a:fillRect/>
+          </a:stretch>
+        </p:blipFill>
+        <p:spPr>
+          <a:xfrm>
+            <a:off x="1143000" y="1238250"/>
+            <a:ext cx="7086600" cy="5314950"/>
+          </a:xfrm>
+          <a:prstGeom prst="rect">
+            <a:avLst/>
+          </a:prstGeom>
+        </p:spPr>
+      </p:pic>
+    </p:spTree>
+    <p:extLst>
+      <p:ext uri="{BB962C8B-B14F-4D97-AF65-F5344CB8AC3E}">
+        <p14:creationId xmlns:p14="http://schemas.microsoft.com/office/powerpoint/2010/main" val="2404354398"/>
+      </p:ext>
+    </p:extLst>
+  </p:cSld>
+  <p:clrMapOvr>
+    <a:masterClrMapping/>
+  </p:clrMapOvr>
 </p:sld>
 </file>
 
@@ -4555,11 +4688,7 @@
             <a:pPr eaLnBrk="1" hangingPunct="1"/>
             <a:r>
               <a:rPr lang="en-US" dirty="0" smtClean="0"/>
-              <a:t>Ph.D</a:t>
-            </a:r>
-            <a:r>
-              <a:rPr lang="en-US" dirty="0" smtClean="0"/>
-              <a:t>. in Fisheries from University of Minnesota</a:t>
+              <a:t>Ph.D. in Fisheries from University of Minnesota</a:t>
             </a:r>
           </a:p>
         </p:txBody>
@@ -5036,7 +5165,6 @@
               <a:rPr lang="en-US" b="1" dirty="0" smtClean="0"/>
               <a:t>Taylor</a:t>
             </a:r>
-            <a:endParaRPr lang="en-US" b="1" dirty="0" smtClean="0"/>
           </a:p>
         </p:txBody>
       </p:sp>
@@ -5087,7 +5215,6 @@
               <a:rPr lang="en-US" dirty="0" smtClean="0"/>
               <a:t>Graduate of Northland College</a:t>
             </a:r>
-            <a:endParaRPr lang="en-US" dirty="0" smtClean="0"/>
           </a:p>
         </p:txBody>
       </p:sp>
@@ -6964,7 +7091,6 @@
                     <a:lumMod val="75000"/>
                   </a:schemeClr>
                 </a:solidFill>
-                <a:hlinkClick r:id="rId2"/>
               </a:rPr>
               <a:t>fishR.wordpress.com</a:t>
             </a:r>
@@ -6980,39 +7106,24 @@
               <a:t>Blog … </a:t>
             </a:r>
             <a:r>
-              <a:rPr lang="en-US" dirty="0" smtClean="0">
-                <a:hlinkClick r:id="rId3"/>
-              </a:rPr>
-              <a:t>fishr.wordpress.com/news/</a:t>
+              <a:rPr lang="en-US" dirty="0" smtClean="0"/>
+              <a:t>fishr.wordpress.com/news/.</a:t>
+            </a:r>
+          </a:p>
+          <a:p>
+            <a:pPr lvl="1"/>
+            <a:r>
+              <a:rPr lang="en-US" dirty="0" smtClean="0"/>
+              <a:t>Twitter … @</a:t>
+            </a:r>
+            <a:r>
+              <a:rPr lang="en-US" dirty="0" err="1" smtClean="0"/>
+              <a:t>fishR_ogle</a:t>
             </a:r>
             <a:r>
               <a:rPr lang="en-US" dirty="0" smtClean="0"/>
               <a:t>.</a:t>
             </a:r>
-          </a:p>
-          <a:p>
-            <a:pPr lvl="1"/>
-            <a:r>
-              <a:rPr lang="en-US" dirty="0" smtClean="0"/>
-              <a:t>Twitter … </a:t>
-            </a:r>
-            <a:r>
-              <a:rPr lang="en-US" dirty="0" smtClean="0">
-                <a:hlinkClick r:id="rId4"/>
-              </a:rPr>
-              <a:t>@</a:t>
-            </a:r>
-            <a:r>
-              <a:rPr lang="en-US" dirty="0" err="1" smtClean="0">
-                <a:hlinkClick r:id="rId4"/>
-              </a:rPr>
-              <a:t>fishR_ogle</a:t>
-            </a:r>
-            <a:r>
-              <a:rPr lang="en-US" dirty="0" smtClean="0"/>
-              <a:t>.</a:t>
-            </a:r>
-            <a:endParaRPr lang="en-US" dirty="0" smtClean="0"/>
           </a:p>
         </p:txBody>
       </p:sp>
@@ -7379,6 +7490,197 @@
       <p:bldP spid="3" grpId="0" uiExpand="1" build="p"/>
     </p:bldLst>
   </p:timing>
+</p:sld>
+</file>
+
+<file path=ppt/slides/slide9.xml><?xml version="1.0" encoding="utf-8"?>
+<p:sld xmlns:a="http://schemas.openxmlformats.org/drawingml/2006/main" xmlns:r="http://schemas.openxmlformats.org/officeDocument/2006/relationships" xmlns:p="http://schemas.openxmlformats.org/presentationml/2006/main">
+  <p:cSld>
+    <p:spTree>
+      <p:nvGrpSpPr>
+        <p:cNvPr id="1" name=""/>
+        <p:cNvGrpSpPr/>
+        <p:nvPr/>
+      </p:nvGrpSpPr>
+      <p:grpSpPr>
+        <a:xfrm>
+          <a:off x="0" y="0"/>
+          <a:ext cx="0" cy="0"/>
+          <a:chOff x="0" y="0"/>
+          <a:chExt cx="0" cy="0"/>
+        </a:xfrm>
+      </p:grpSpPr>
+      <p:sp>
+        <p:nvSpPr>
+          <p:cNvPr id="2" name="Title 1"/>
+          <p:cNvSpPr>
+            <a:spLocks noGrp="1"/>
+          </p:cNvSpPr>
+          <p:nvPr>
+            <p:ph type="title"/>
+          </p:nvPr>
+        </p:nvSpPr>
+        <p:spPr/>
+        <p:txBody>
+          <a:bodyPr/>
+          <a:lstStyle/>
+          <a:p>
+            <a:r>
+              <a:rPr lang="en-US" dirty="0" smtClean="0"/>
+              <a:t>This Better Go Well!!</a:t>
+            </a:r>
+            <a:endParaRPr lang="en-US" dirty="0"/>
+          </a:p>
+        </p:txBody>
+      </p:sp>
+      <p:sp>
+        <p:nvSpPr>
+          <p:cNvPr id="4" name="Footer Placeholder 3"/>
+          <p:cNvSpPr>
+            <a:spLocks noGrp="1"/>
+          </p:cNvSpPr>
+          <p:nvPr>
+            <p:ph type="ftr" sz="quarter" idx="11"/>
+          </p:nvPr>
+        </p:nvSpPr>
+        <p:spPr/>
+        <p:txBody>
+          <a:bodyPr/>
+          <a:lstStyle/>
+          <a:p>
+            <a:pPr>
+              <a:defRPr/>
+            </a:pPr>
+            <a:r>
+              <a:rPr lang="en-US" smtClean="0"/>
+              <a:t>Age &amp; Growth R  ●  Portland, OR ●  16 August 2015</a:t>
+            </a:r>
+            <a:endParaRPr lang="en-US" dirty="0"/>
+          </a:p>
+        </p:txBody>
+      </p:sp>
+      <p:sp>
+        <p:nvSpPr>
+          <p:cNvPr id="5" name="Slide Number Placeholder 4"/>
+          <p:cNvSpPr>
+            <a:spLocks noGrp="1"/>
+          </p:cNvSpPr>
+          <p:nvPr>
+            <p:ph type="sldNum" sz="quarter" idx="12"/>
+          </p:nvPr>
+        </p:nvSpPr>
+        <p:spPr/>
+        <p:txBody>
+          <a:bodyPr/>
+          <a:lstStyle/>
+          <a:p>
+            <a:pPr>
+              <a:defRPr/>
+            </a:pPr>
+            <a:fld id="{BAF8C091-A6FE-48E1-884E-65DA2FC7D7EA}" type="slidenum">
+              <a:rPr lang="en-US" smtClean="0"/>
+              <a:pPr>
+                <a:defRPr/>
+              </a:pPr>
+              <a:t>9</a:t>
+            </a:fld>
+            <a:endParaRPr lang="en-US"/>
+          </a:p>
+        </p:txBody>
+      </p:sp>
+      <p:pic>
+        <p:nvPicPr>
+          <p:cNvPr id="1026" name="Picture 2" descr="http://www.travelwisconsin.com/uploads/events/e6/e614bdde-745c-484a-88fe-478413ab7eea-big-top-chautauqua.jpg?preset=detail-slider-desktop"/>
+          <p:cNvPicPr>
+            <a:picLocks noChangeAspect="1" noChangeArrowheads="1"/>
+          </p:cNvPicPr>
+          <p:nvPr/>
+        </p:nvPicPr>
+        <p:blipFill>
+          <a:blip r:embed="rId2">
+            <a:extLst>
+              <a:ext uri="{28A0092B-C50C-407E-A947-70E740481C1C}">
+                <a14:useLocalDpi xmlns:a14="http://schemas.microsoft.com/office/drawing/2010/main" val="0"/>
+              </a:ext>
+            </a:extLst>
+          </a:blip>
+          <a:srcRect/>
+          <a:stretch>
+            <a:fillRect/>
+          </a:stretch>
+        </p:blipFill>
+        <p:spPr bwMode="auto">
+          <a:xfrm>
+            <a:off x="304800" y="1371600"/>
+            <a:ext cx="8534400" cy="4267200"/>
+          </a:xfrm>
+          <a:prstGeom prst="rect">
+            <a:avLst/>
+          </a:prstGeom>
+          <a:noFill/>
+          <a:extLst>
+            <a:ext uri="{909E8E84-426E-40DD-AFC4-6F175D3DCCD1}">
+              <a14:hiddenFill xmlns:a14="http://schemas.microsoft.com/office/drawing/2010/main">
+                <a:solidFill>
+                  <a:srgbClr val="FFFFFF"/>
+                </a:solidFill>
+              </a14:hiddenFill>
+            </a:ext>
+          </a:extLst>
+        </p:spPr>
+      </p:pic>
+      <p:sp>
+        <p:nvSpPr>
+          <p:cNvPr id="6" name="TextBox 5"/>
+          <p:cNvSpPr txBox="1"/>
+          <p:nvPr/>
+        </p:nvSpPr>
+        <p:spPr>
+          <a:xfrm>
+            <a:off x="2362200" y="5791200"/>
+            <a:ext cx="4724400" cy="646331"/>
+          </a:xfrm>
+          <a:prstGeom prst="rect">
+            <a:avLst/>
+          </a:prstGeom>
+          <a:noFill/>
+        </p:spPr>
+        <p:txBody>
+          <a:bodyPr wrap="square" rtlCol="0">
+            <a:spAutoFit/>
+          </a:bodyPr>
+          <a:lstStyle/>
+          <a:p>
+            <a:r>
+              <a:rPr lang="en-US" sz="3600" b="1" dirty="0" smtClean="0">
+                <a:solidFill>
+                  <a:schemeClr val="bg2">
+                    <a:lumMod val="50000"/>
+                  </a:schemeClr>
+                </a:solidFill>
+              </a:rPr>
+              <a:t>Big Top Chautauqua</a:t>
+            </a:r>
+            <a:endParaRPr lang="en-US" sz="3600" b="1" dirty="0">
+              <a:solidFill>
+                <a:schemeClr val="bg2">
+                  <a:lumMod val="50000"/>
+                </a:schemeClr>
+              </a:solidFill>
+            </a:endParaRPr>
+          </a:p>
+        </p:txBody>
+      </p:sp>
+    </p:spTree>
+    <p:extLst>
+      <p:ext uri="{BB962C8B-B14F-4D97-AF65-F5344CB8AC3E}">
+        <p14:creationId xmlns:p14="http://schemas.microsoft.com/office/powerpoint/2010/main" val="1826880620"/>
+      </p:ext>
+    </p:extLst>
+  </p:cSld>
+  <p:clrMapOvr>
+    <a:masterClrMapping/>
+  </p:clrMapOvr>
 </p:sld>
 </file>
 

</xml_diff>